<commit_message>
remise du projet final
</commit_message>
<xml_diff>
--- a/C61/Sprint3/Doc/Presentation_Kiosque.pptx
+++ b/C61/Sprint3/Doc/Presentation_Kiosque.pptx
@@ -105,6 +105,11 @@
       </a:defRPr>
     </a:lvl9pPr>
   </p:defaultTextStyle>
+  <p:extLst>
+    <p:ext uri="{EFAFB233-063F-42B5-8137-9DF3F51BA10A}">
+      <p15:sldGuideLst xmlns:p15="http://schemas.microsoft.com/office/powerpoint/2012/main"/>
+    </p:ext>
+  </p:extLst>
 </p:presentation>
 </file>
 
@@ -3367,6 +3372,9 @@
             <a:spLocks noGrp="1" noRot="1" noChangeAspect="1" noMove="1" noResize="1" noEditPoints="1" noAdjustHandles="1" noChangeArrowheads="1" noChangeShapeType="1" noTextEdit="1"/>
           </p:cNvSpPr>
           <p:nvPr>
+            <p:custDataLst>
+              <p:tags r:id="rId1"/>
+            </p:custDataLst>
             <p:extLst>
               <p:ext uri="{386F3935-93C4-4BCD-93E2-E3B085C9AB24}">
                 <p16:designElem xmlns:p16="http://schemas.microsoft.com/office/powerpoint/2015/main" val="1"/>
@@ -3426,10 +3434,14 @@
           <p:cNvPicPr>
             <a:picLocks noChangeAspect="1"/>
           </p:cNvPicPr>
-          <p:nvPr/>
+          <p:nvPr>
+            <p:custDataLst>
+              <p:tags r:id="rId2"/>
+            </p:custDataLst>
+          </p:nvPr>
         </p:nvPicPr>
         <p:blipFill rotWithShape="1">
-          <a:blip r:embed="rId2">
+          <a:blip r:embed="rId7">
             <a:alphaModFix amt="50000"/>
           </a:blip>
           <a:srcRect t="11570" b="4160"/>
@@ -3459,6 +3471,9 @@
           </p:cNvSpPr>
           <p:nvPr>
             <p:ph type="ctrTitle"/>
+            <p:custDataLst>
+              <p:tags r:id="rId3"/>
+            </p:custDataLst>
           </p:nvPr>
         </p:nvSpPr>
         <p:spPr>
@@ -3514,6 +3529,9 @@
           </p:cNvSpPr>
           <p:nvPr>
             <p:ph type="subTitle" idx="1"/>
+            <p:custDataLst>
+              <p:tags r:id="rId4"/>
+            </p:custDataLst>
           </p:nvPr>
         </p:nvSpPr>
         <p:spPr>
@@ -3552,7 +3570,11 @@
             </a:extLst>
           </p:cNvPr>
           <p:cNvSpPr txBox="1"/>
-          <p:nvPr/>
+          <p:nvPr>
+            <p:custDataLst>
+              <p:tags r:id="rId5"/>
+            </p:custDataLst>
+          </p:nvPr>
         </p:nvSpPr>
         <p:spPr>
           <a:xfrm>
@@ -3603,13 +3625,13 @@
   <p:clrMapOvr>
     <a:overrideClrMapping bg1="dk1" tx1="lt1" bg2="dk2" tx2="lt2" accent1="accent1" accent2="accent2" accent3="accent3" accent4="accent4" accent5="accent5" accent6="accent6" hlink="hlink" folHlink="folHlink"/>
   </p:clrMapOvr>
-  <mc:AlternateContent xmlns:mc="http://schemas.openxmlformats.org/markup-compatibility/2006">
-    <mc:Choice xmlns:p14="http://schemas.microsoft.com/office/powerpoint/2010/main" Requires="p14">
+  <mc:AlternateContent xmlns:mc="http://schemas.openxmlformats.org/markup-compatibility/2006" xmlns:p14="http://schemas.microsoft.com/office/powerpoint/2010/main">
+    <mc:Choice Requires="p14">
       <p:transition spd="slow" p14:dur="3400" advTm="25573">
         <p14:reveal/>
       </p:transition>
     </mc:Choice>
-    <mc:Fallback>
+    <mc:Fallback xmlns="">
       <p:transition spd="slow" advTm="25573">
         <p:fade/>
       </p:transition>
@@ -3837,6 +3859,9 @@
             <a:spLocks noGrp="1" noRot="1" noChangeAspect="1" noMove="1" noResize="1" noEditPoints="1" noAdjustHandles="1" noChangeArrowheads="1" noChangeShapeType="1" noTextEdit="1"/>
           </p:cNvSpPr>
           <p:nvPr>
+            <p:custDataLst>
+              <p:tags r:id="rId1"/>
+            </p:custDataLst>
             <p:extLst>
               <p:ext uri="{386F3935-93C4-4BCD-93E2-E3B085C9AB24}">
                 <p16:designElem xmlns:p16="http://schemas.microsoft.com/office/powerpoint/2015/main" val="1"/>
@@ -3893,10 +3918,14 @@
           <p:cNvPicPr>
             <a:picLocks noChangeAspect="1"/>
           </p:cNvPicPr>
-          <p:nvPr/>
+          <p:nvPr>
+            <p:custDataLst>
+              <p:tags r:id="rId2"/>
+            </p:custDataLst>
+          </p:nvPr>
         </p:nvPicPr>
         <p:blipFill rotWithShape="1">
-          <a:blip r:embed="rId2"/>
+          <a:blip r:embed="rId8"/>
           <a:srcRect t="11329" r="-1" b="12234"/>
           <a:stretch/>
         </p:blipFill>
@@ -3926,6 +3955,9 @@
             <a:spLocks noGrp="1" noRot="1" noChangeAspect="1" noMove="1" noResize="1" noEditPoints="1" noAdjustHandles="1" noChangeArrowheads="1" noChangeShapeType="1" noTextEdit="1"/>
           </p:cNvSpPr>
           <p:nvPr>
+            <p:custDataLst>
+              <p:tags r:id="rId3"/>
+            </p:custDataLst>
             <p:extLst>
               <p:ext uri="{386F3935-93C4-4BCD-93E2-E3B085C9AB24}">
                 <p16:designElem xmlns:p16="http://schemas.microsoft.com/office/powerpoint/2015/main" val="1"/>
@@ -4018,6 +4050,9 @@
           </p:cNvSpPr>
           <p:nvPr>
             <p:ph type="title"/>
+            <p:custDataLst>
+              <p:tags r:id="rId4"/>
+            </p:custDataLst>
           </p:nvPr>
         </p:nvSpPr>
         <p:spPr>
@@ -4059,6 +4094,9 @@
             <a:cxnSpLocks noGrp="1" noRot="1" noChangeAspect="1" noMove="1" noResize="1" noEditPoints="1" noAdjustHandles="1" noChangeArrowheads="1" noChangeShapeType="1"/>
           </p:cNvCxnSpPr>
           <p:nvPr>
+            <p:custDataLst>
+              <p:tags r:id="rId5"/>
+            </p:custDataLst>
             <p:extLst>
               <p:ext uri="{386F3935-93C4-4BCD-93E2-E3B085C9AB24}">
                 <p16:designElem xmlns:p16="http://schemas.microsoft.com/office/powerpoint/2015/main" val="1"/>
@@ -4111,6 +4149,9 @@
           </p:cNvSpPr>
           <p:nvPr>
             <p:ph idx="1"/>
+            <p:custDataLst>
+              <p:tags r:id="rId6"/>
+            </p:custDataLst>
           </p:nvPr>
         </p:nvSpPr>
         <p:spPr>
@@ -4222,19 +4263,85 @@
   <p:clrMapOvr>
     <a:overrideClrMapping bg1="dk1" tx1="lt1" bg2="dk2" tx2="lt2" accent1="accent1" accent2="accent2" accent3="accent3" accent4="accent4" accent5="accent5" accent6="accent6" hlink="hlink" folHlink="folHlink"/>
   </p:clrMapOvr>
-  <mc:AlternateContent xmlns:mc="http://schemas.openxmlformats.org/markup-compatibility/2006">
-    <mc:Choice xmlns:p159="http://schemas.microsoft.com/office/powerpoint/2015/09/main" Requires="p159">
+  <mc:AlternateContent xmlns:mc="http://schemas.openxmlformats.org/markup-compatibility/2006" xmlns:p159="http://schemas.microsoft.com/office/powerpoint/2015/09/main">
+    <mc:Choice Requires="p159">
       <p:transition xmlns:p14="http://schemas.microsoft.com/office/powerpoint/2010/main" spd="slow" p14:dur="2000" advTm="23390">
         <p159:morph option="byObject"/>
       </p:transition>
     </mc:Choice>
-    <mc:Fallback>
+    <mc:Fallback xmlns="">
       <p:transition spd="slow" advTm="23390">
         <p:fade/>
       </p:transition>
     </mc:Fallback>
   </mc:AlternateContent>
 </p:sld>
+</file>
+
+<file path=ppt/tags/tag1.xml><?xml version="1.0" encoding="utf-8"?>
+<p:tagLst xmlns:a="http://schemas.openxmlformats.org/drawingml/2006/main" xmlns:r="http://schemas.openxmlformats.org/officeDocument/2006/relationships" xmlns:p="http://schemas.openxmlformats.org/presentationml/2006/main">
+  <p:tag name="NUM" val="1"/>
+</p:tagLst>
+</file>
+
+<file path=ppt/tags/tag10.xml><?xml version="1.0" encoding="utf-8"?>
+<p:tagLst xmlns:a="http://schemas.openxmlformats.org/drawingml/2006/main" xmlns:r="http://schemas.openxmlformats.org/officeDocument/2006/relationships" xmlns:p="http://schemas.openxmlformats.org/presentationml/2006/main">
+  <p:tag name="NUM" val="5"/>
+</p:tagLst>
+</file>
+
+<file path=ppt/tags/tag11.xml><?xml version="1.0" encoding="utf-8"?>
+<p:tagLst xmlns:a="http://schemas.openxmlformats.org/drawingml/2006/main" xmlns:r="http://schemas.openxmlformats.org/officeDocument/2006/relationships" xmlns:p="http://schemas.openxmlformats.org/presentationml/2006/main">
+  <p:tag name="NUM" val="6"/>
+</p:tagLst>
+</file>
+
+<file path=ppt/tags/tag2.xml><?xml version="1.0" encoding="utf-8"?>
+<p:tagLst xmlns:a="http://schemas.openxmlformats.org/drawingml/2006/main" xmlns:r="http://schemas.openxmlformats.org/officeDocument/2006/relationships" xmlns:p="http://schemas.openxmlformats.org/presentationml/2006/main">
+  <p:tag name="NUM" val="2"/>
+</p:tagLst>
+</file>
+
+<file path=ppt/tags/tag3.xml><?xml version="1.0" encoding="utf-8"?>
+<p:tagLst xmlns:a="http://schemas.openxmlformats.org/drawingml/2006/main" xmlns:r="http://schemas.openxmlformats.org/officeDocument/2006/relationships" xmlns:p="http://schemas.openxmlformats.org/presentationml/2006/main">
+  <p:tag name="NUM" val="3"/>
+</p:tagLst>
+</file>
+
+<file path=ppt/tags/tag4.xml><?xml version="1.0" encoding="utf-8"?>
+<p:tagLst xmlns:a="http://schemas.openxmlformats.org/drawingml/2006/main" xmlns:r="http://schemas.openxmlformats.org/officeDocument/2006/relationships" xmlns:p="http://schemas.openxmlformats.org/presentationml/2006/main">
+  <p:tag name="NUM" val="4"/>
+</p:tagLst>
+</file>
+
+<file path=ppt/tags/tag5.xml><?xml version="1.0" encoding="utf-8"?>
+<p:tagLst xmlns:a="http://schemas.openxmlformats.org/drawingml/2006/main" xmlns:r="http://schemas.openxmlformats.org/officeDocument/2006/relationships" xmlns:p="http://schemas.openxmlformats.org/presentationml/2006/main">
+  <p:tag name="NUM" val="5"/>
+</p:tagLst>
+</file>
+
+<file path=ppt/tags/tag6.xml><?xml version="1.0" encoding="utf-8"?>
+<p:tagLst xmlns:a="http://schemas.openxmlformats.org/drawingml/2006/main" xmlns:r="http://schemas.openxmlformats.org/officeDocument/2006/relationships" xmlns:p="http://schemas.openxmlformats.org/presentationml/2006/main">
+  <p:tag name="NUM" val="1"/>
+</p:tagLst>
+</file>
+
+<file path=ppt/tags/tag7.xml><?xml version="1.0" encoding="utf-8"?>
+<p:tagLst xmlns:a="http://schemas.openxmlformats.org/drawingml/2006/main" xmlns:r="http://schemas.openxmlformats.org/officeDocument/2006/relationships" xmlns:p="http://schemas.openxmlformats.org/presentationml/2006/main">
+  <p:tag name="NUM" val="2"/>
+</p:tagLst>
+</file>
+
+<file path=ppt/tags/tag8.xml><?xml version="1.0" encoding="utf-8"?>
+<p:tagLst xmlns:a="http://schemas.openxmlformats.org/drawingml/2006/main" xmlns:r="http://schemas.openxmlformats.org/officeDocument/2006/relationships" xmlns:p="http://schemas.openxmlformats.org/presentationml/2006/main">
+  <p:tag name="NUM" val="3"/>
+</p:tagLst>
+</file>
+
+<file path=ppt/tags/tag9.xml><?xml version="1.0" encoding="utf-8"?>
+<p:tagLst xmlns:a="http://schemas.openxmlformats.org/drawingml/2006/main" xmlns:r="http://schemas.openxmlformats.org/officeDocument/2006/relationships" xmlns:p="http://schemas.openxmlformats.org/presentationml/2006/main">
+  <p:tag name="NUM" val="4"/>
+</p:tagLst>
 </file>
 
 <file path=ppt/theme/theme1.xml><?xml version="1.0" encoding="utf-8"?>

</xml_diff>